<commit_message>
romove uncorrected analysis and fill up propoasal ppt
</commit_message>
<xml_diff>
--- a/proposal.pptx
+++ b/proposal.pptx
@@ -127,6 +127,11 @@
       </a:defRPr>
     </a:lvl9pPr>
   </p:defaultTextStyle>
+  <p:extLst>
+    <p:ext uri="{EFAFB233-063F-42B5-8137-9DF3F51BA10A}">
+      <p15:sldGuideLst xmlns:p15="http://schemas.microsoft.com/office/powerpoint/2012/main"/>
+    </p:ext>
+  </p:extLst>
 </p:presentation>
 </file>
 
@@ -261,7 +266,7 @@
           <a:p>
             <a:fld id="{96009902-6F0F-4FC2-9144-3BB941C42B38}" type="datetimeFigureOut">
               <a:rPr lang="zh-TW" altLang="en-US" smtClean="0"/>
-              <a:t>2020/6/8</a:t>
+              <a:t>2020/6/9</a:t>
             </a:fld>
             <a:endParaRPr lang="zh-TW" altLang="en-US"/>
           </a:p>
@@ -431,7 +436,7 @@
           <a:p>
             <a:fld id="{96009902-6F0F-4FC2-9144-3BB941C42B38}" type="datetimeFigureOut">
               <a:rPr lang="zh-TW" altLang="en-US" smtClean="0"/>
-              <a:t>2020/6/8</a:t>
+              <a:t>2020/6/9</a:t>
             </a:fld>
             <a:endParaRPr lang="zh-TW" altLang="en-US"/>
           </a:p>
@@ -611,7 +616,7 @@
           <a:p>
             <a:fld id="{96009902-6F0F-4FC2-9144-3BB941C42B38}" type="datetimeFigureOut">
               <a:rPr lang="zh-TW" altLang="en-US" smtClean="0"/>
-              <a:t>2020/6/8</a:t>
+              <a:t>2020/6/9</a:t>
             </a:fld>
             <a:endParaRPr lang="zh-TW" altLang="en-US"/>
           </a:p>
@@ -781,7 +786,7 @@
           <a:p>
             <a:fld id="{96009902-6F0F-4FC2-9144-3BB941C42B38}" type="datetimeFigureOut">
               <a:rPr lang="zh-TW" altLang="en-US" smtClean="0"/>
-              <a:t>2020/6/8</a:t>
+              <a:t>2020/6/9</a:t>
             </a:fld>
             <a:endParaRPr lang="zh-TW" altLang="en-US"/>
           </a:p>
@@ -1027,7 +1032,7 @@
           <a:p>
             <a:fld id="{96009902-6F0F-4FC2-9144-3BB941C42B38}" type="datetimeFigureOut">
               <a:rPr lang="zh-TW" altLang="en-US" smtClean="0"/>
-              <a:t>2020/6/8</a:t>
+              <a:t>2020/6/9</a:t>
             </a:fld>
             <a:endParaRPr lang="zh-TW" altLang="en-US"/>
           </a:p>
@@ -1259,7 +1264,7 @@
           <a:p>
             <a:fld id="{96009902-6F0F-4FC2-9144-3BB941C42B38}" type="datetimeFigureOut">
               <a:rPr lang="zh-TW" altLang="en-US" smtClean="0"/>
-              <a:t>2020/6/8</a:t>
+              <a:t>2020/6/9</a:t>
             </a:fld>
             <a:endParaRPr lang="zh-TW" altLang="en-US"/>
           </a:p>
@@ -1626,7 +1631,7 @@
           <a:p>
             <a:fld id="{96009902-6F0F-4FC2-9144-3BB941C42B38}" type="datetimeFigureOut">
               <a:rPr lang="zh-TW" altLang="en-US" smtClean="0"/>
-              <a:t>2020/6/8</a:t>
+              <a:t>2020/6/9</a:t>
             </a:fld>
             <a:endParaRPr lang="zh-TW" altLang="en-US"/>
           </a:p>
@@ -1744,7 +1749,7 @@
           <a:p>
             <a:fld id="{96009902-6F0F-4FC2-9144-3BB941C42B38}" type="datetimeFigureOut">
               <a:rPr lang="zh-TW" altLang="en-US" smtClean="0"/>
-              <a:t>2020/6/8</a:t>
+              <a:t>2020/6/9</a:t>
             </a:fld>
             <a:endParaRPr lang="zh-TW" altLang="en-US"/>
           </a:p>
@@ -1839,7 +1844,7 @@
           <a:p>
             <a:fld id="{96009902-6F0F-4FC2-9144-3BB941C42B38}" type="datetimeFigureOut">
               <a:rPr lang="zh-TW" altLang="en-US" smtClean="0"/>
-              <a:t>2020/6/8</a:t>
+              <a:t>2020/6/9</a:t>
             </a:fld>
             <a:endParaRPr lang="zh-TW" altLang="en-US"/>
           </a:p>
@@ -2116,7 +2121,7 @@
           <a:p>
             <a:fld id="{96009902-6F0F-4FC2-9144-3BB941C42B38}" type="datetimeFigureOut">
               <a:rPr lang="zh-TW" altLang="en-US" smtClean="0"/>
-              <a:t>2020/6/8</a:t>
+              <a:t>2020/6/9</a:t>
             </a:fld>
             <a:endParaRPr lang="zh-TW" altLang="en-US"/>
           </a:p>
@@ -2369,7 +2374,7 @@
           <a:p>
             <a:fld id="{96009902-6F0F-4FC2-9144-3BB941C42B38}" type="datetimeFigureOut">
               <a:rPr lang="zh-TW" altLang="en-US" smtClean="0"/>
-              <a:t>2020/6/8</a:t>
+              <a:t>2020/6/9</a:t>
             </a:fld>
             <a:endParaRPr lang="zh-TW" altLang="en-US"/>
           </a:p>
@@ -2582,7 +2587,7 @@
           <a:p>
             <a:fld id="{96009902-6F0F-4FC2-9144-3BB941C42B38}" type="datetimeFigureOut">
               <a:rPr lang="zh-TW" altLang="en-US" smtClean="0"/>
-              <a:t>2020/6/8</a:t>
+              <a:t>2020/6/9</a:t>
             </a:fld>
             <a:endParaRPr lang="zh-TW" altLang="en-US"/>
           </a:p>
@@ -3430,6 +3435,102 @@
           <a:chExt cx="0" cy="0"/>
         </a:xfrm>
       </p:grpSpPr>
+      <p:pic>
+        <p:nvPicPr>
+          <p:cNvPr id="2" name="圖片 1"/>
+          <p:cNvPicPr>
+            <a:picLocks noChangeAspect="1"/>
+          </p:cNvPicPr>
+          <p:nvPr/>
+        </p:nvPicPr>
+        <p:blipFill>
+          <a:blip r:embed="rId2"/>
+          <a:stretch>
+            <a:fillRect/>
+          </a:stretch>
+        </p:blipFill>
+        <p:spPr>
+          <a:xfrm>
+            <a:off x="0" y="531220"/>
+            <a:ext cx="6274333" cy="4818020"/>
+          </a:xfrm>
+          <a:prstGeom prst="rect">
+            <a:avLst/>
+          </a:prstGeom>
+        </p:spPr>
+      </p:pic>
+      <p:pic>
+        <p:nvPicPr>
+          <p:cNvPr id="3" name="圖片 2"/>
+          <p:cNvPicPr>
+            <a:picLocks noChangeAspect="1"/>
+          </p:cNvPicPr>
+          <p:nvPr/>
+        </p:nvPicPr>
+        <p:blipFill>
+          <a:blip r:embed="rId3"/>
+          <a:stretch>
+            <a:fillRect/>
+          </a:stretch>
+        </p:blipFill>
+        <p:spPr>
+          <a:xfrm>
+            <a:off x="708663" y="5349240"/>
+            <a:ext cx="5565670" cy="586200"/>
+          </a:xfrm>
+          <a:prstGeom prst="rect">
+            <a:avLst/>
+          </a:prstGeom>
+        </p:spPr>
+      </p:pic>
+      <p:pic>
+        <p:nvPicPr>
+          <p:cNvPr id="4" name="圖片 3"/>
+          <p:cNvPicPr>
+            <a:picLocks noChangeAspect="1"/>
+          </p:cNvPicPr>
+          <p:nvPr/>
+        </p:nvPicPr>
+        <p:blipFill>
+          <a:blip r:embed="rId4"/>
+          <a:stretch>
+            <a:fillRect/>
+          </a:stretch>
+        </p:blipFill>
+        <p:spPr>
+          <a:xfrm>
+            <a:off x="6274333" y="531220"/>
+            <a:ext cx="5429988" cy="4400177"/>
+          </a:xfrm>
+          <a:prstGeom prst="rect">
+            <a:avLst/>
+          </a:prstGeom>
+        </p:spPr>
+      </p:pic>
+      <p:pic>
+        <p:nvPicPr>
+          <p:cNvPr id="5" name="圖片 4"/>
+          <p:cNvPicPr>
+            <a:picLocks noChangeAspect="1"/>
+          </p:cNvPicPr>
+          <p:nvPr/>
+        </p:nvPicPr>
+        <p:blipFill>
+          <a:blip r:embed="rId5"/>
+          <a:stretch>
+            <a:fillRect/>
+          </a:stretch>
+        </p:blipFill>
+        <p:spPr>
+          <a:xfrm>
+            <a:off x="6520142" y="4931397"/>
+            <a:ext cx="5184180" cy="512925"/>
+          </a:xfrm>
+          <a:prstGeom prst="rect">
+            <a:avLst/>
+          </a:prstGeom>
+        </p:spPr>
+      </p:pic>
     </p:spTree>
     <p:extLst>
       <p:ext uri="{BB962C8B-B14F-4D97-AF65-F5344CB8AC3E}">
@@ -3589,7 +3690,18 @@
           <a:p>
             <a:r>
               <a:rPr lang="en-US" altLang="zh-TW" dirty="0" smtClean="0"/>
-              <a:t>Date	Confirmed	</a:t>
+              <a:t>Date	</a:t>
+            </a:r>
+            <a:endParaRPr lang="en-US" altLang="zh-TW" dirty="0" smtClean="0"/>
+          </a:p>
+          <a:p>
+            <a:r>
+              <a:rPr lang="en-US" altLang="zh-TW" dirty="0" smtClean="0"/>
+              <a:t>Confirmed</a:t>
+            </a:r>
+            <a:r>
+              <a:rPr lang="en-US" altLang="zh-TW" dirty="0" smtClean="0"/>
+              <a:t>	</a:t>
             </a:r>
           </a:p>
           <a:p>
@@ -3657,7 +3769,7 @@
       </p:grpSpPr>
       <p:pic>
         <p:nvPicPr>
-          <p:cNvPr id="4" name="下載 (4)">
+          <p:cNvPr id="3" name="下載 (5)">
             <a:hlinkClick r:id="" action="ppaction://media"/>
           </p:cNvPr>
           <p:cNvPicPr>
@@ -3681,8 +3793,8 @@
         </p:blipFill>
         <p:spPr>
           <a:xfrm>
-            <a:off x="2046415" y="1084961"/>
-            <a:ext cx="8702675" cy="4351338"/>
+            <a:off x="417576" y="1287780"/>
+            <a:ext cx="11608308" cy="3869436"/>
           </a:xfrm>
         </p:spPr>
       </p:pic>
@@ -3706,7 +3818,7 @@
                 <p:stCondLst>
                   <p:cond evt="onClick" delay="0">
                     <p:tgtEl>
-                      <p:spTgt spid="4"/>
+                      <p:spTgt spid="3"/>
                     </p:tgtEl>
                   </p:cond>
                 </p:stCondLst>
@@ -3736,7 +3848,7 @@
                                       <p:cBhvr>
                                         <p:cTn id="6" dur="1" fill="hold"/>
                                         <p:tgtEl>
-                                          <p:spTgt spid="4"/>
+                                          <p:spTgt spid="3"/>
                                         </p:tgtEl>
                                       </p:cBhvr>
                                     </p:cmd>
@@ -3754,7 +3866,7 @@
               <p:nextCondLst>
                 <p:cond evt="onClick" delay="0">
                   <p:tgtEl>
-                    <p:spTgt spid="4"/>
+                    <p:spTgt spid="3"/>
                   </p:tgtEl>
                 </p:cond>
               </p:nextCondLst>
@@ -3767,7 +3879,7 @@
                   </p:stCondLst>
                 </p:cTn>
                 <p:tgtEl>
-                  <p:spTgt spid="4"/>
+                  <p:spTgt spid="3"/>
                 </p:tgtEl>
               </p:cMediaNode>
             </p:video>
@@ -4345,15 +4457,113 @@
             <p:ph idx="1"/>
           </p:nvPr>
         </p:nvSpPr>
-        <p:spPr/>
-        <p:txBody>
-          <a:bodyPr/>
-          <a:lstStyle/>
-          <a:p>
-            <a:endParaRPr lang="zh-TW" altLang="en-US"/>
-          </a:p>
-        </p:txBody>
-      </p:sp>
+        <p:spPr>
+          <a:xfrm>
+            <a:off x="838200" y="1578737"/>
+            <a:ext cx="10515600" cy="4351338"/>
+          </a:xfrm>
+        </p:spPr>
+        <p:txBody>
+          <a:bodyPr/>
+          <a:lstStyle/>
+          <a:p>
+            <a:r>
+              <a:rPr lang="en-US" altLang="zh-TW" dirty="0"/>
+              <a:t>coefficient </a:t>
+            </a:r>
+            <a:r>
+              <a:rPr lang="en-US" altLang="zh-TW" dirty="0" smtClean="0"/>
+              <a:t>of</a:t>
+            </a:r>
+            <a:r>
+              <a:rPr lang="zh-TW" altLang="en-US" dirty="0" smtClean="0"/>
+              <a:t> </a:t>
+            </a:r>
+            <a:r>
+              <a:rPr lang="en-US" altLang="zh-TW" dirty="0" smtClean="0"/>
+              <a:t>determination</a:t>
+            </a:r>
+          </a:p>
+          <a:p>
+            <a:r>
+              <a:rPr lang="zh-TW" altLang="en-US" dirty="0" smtClean="0"/>
+              <a:t>越接近</a:t>
+            </a:r>
+            <a:r>
+              <a:rPr lang="en-US" altLang="zh-TW" dirty="0" smtClean="0"/>
+              <a:t>1</a:t>
+            </a:r>
+            <a:r>
+              <a:rPr lang="zh-TW" altLang="en-US" dirty="0" smtClean="0"/>
+              <a:t>越好</a:t>
+            </a:r>
+            <a:endParaRPr lang="en-US" altLang="zh-TW" dirty="0" smtClean="0"/>
+          </a:p>
+          <a:p>
+            <a:r>
+              <a:rPr lang="zh-TW" altLang="en-US" dirty="0" smtClean="0"/>
+              <a:t>衡量</a:t>
+            </a:r>
+            <a:r>
+              <a:rPr lang="en-US" altLang="zh-TW" dirty="0" smtClean="0"/>
+              <a:t>regression</a:t>
+            </a:r>
+            <a:r>
+              <a:rPr lang="zh-TW" altLang="en-US" dirty="0" smtClean="0"/>
+              <a:t>另一種方</a:t>
+            </a:r>
+            <a:r>
+              <a:rPr lang="zh-TW" altLang="en-US" dirty="0"/>
+              <a:t>法</a:t>
+            </a:r>
+            <a:endParaRPr lang="en-US" altLang="zh-TW" dirty="0" smtClean="0"/>
+          </a:p>
+          <a:p>
+            <a:endParaRPr lang="zh-TW" altLang="en-US" dirty="0"/>
+          </a:p>
+        </p:txBody>
+      </p:sp>
+      <p:pic>
+        <p:nvPicPr>
+          <p:cNvPr id="1026" name="Picture 2" descr="https://img-blog.csdn.net/2018091112110969?watermark/2/text/aHR0cHM6Ly9ibG9nLmNzZG4ubmV0L1JleF9XVVNU/font/5a6L5L2T/fontsize/400/fill/I0JBQkFCMA==/dissolve/70"/>
+          <p:cNvPicPr>
+            <a:picLocks noChangeAspect="1" noChangeArrowheads="1"/>
+          </p:cNvPicPr>
+          <p:nvPr/>
+        </p:nvPicPr>
+        <p:blipFill>
+          <a:blip r:embed="rId2">
+            <a:extLst>
+              <a:ext uri="{28A0092B-C50C-407E-A947-70E740481C1C}">
+                <a14:useLocalDpi xmlns:a14="http://schemas.microsoft.com/office/drawing/2010/main" val="0"/>
+              </a:ext>
+            </a:extLst>
+          </a:blip>
+          <a:srcRect/>
+          <a:stretch>
+            <a:fillRect/>
+          </a:stretch>
+        </p:blipFill>
+        <p:spPr bwMode="auto">
+          <a:xfrm>
+            <a:off x="5925312" y="869105"/>
+            <a:ext cx="6083399" cy="5604848"/>
+          </a:xfrm>
+          <a:prstGeom prst="rect">
+            <a:avLst/>
+          </a:prstGeom>
+          <a:noFill/>
+          <a:extLst>
+            <a:ext uri="{909E8E84-426E-40DD-AFC4-6F175D3DCCD1}">
+              <a14:hiddenFill xmlns:a14="http://schemas.microsoft.com/office/drawing/2010/main">
+                <a:solidFill>
+                  <a:srgbClr val="FFFFFF"/>
+                </a:solidFill>
+              </a14:hiddenFill>
+            </a:ext>
+          </a:extLst>
+        </p:spPr>
+      </p:pic>
     </p:spTree>
     <p:extLst>
       <p:ext uri="{BB962C8B-B14F-4D97-AF65-F5344CB8AC3E}">
@@ -4505,7 +4715,30 @@
           <a:bodyPr/>
           <a:lstStyle/>
           <a:p>
-            <a:endParaRPr lang="zh-TW" altLang="en-US"/>
+            <a:r>
+              <a:rPr lang="zh-TW" altLang="en-US" dirty="0" smtClean="0"/>
+              <a:t>和</a:t>
+            </a:r>
+            <a:r>
+              <a:rPr lang="en-US" altLang="zh-TW" dirty="0" err="1" smtClean="0"/>
+              <a:t>RandomForest</a:t>
+            </a:r>
+            <a:r>
+              <a:rPr lang="zh-TW" altLang="en-US" dirty="0" smtClean="0"/>
+              <a:t>相同原理</a:t>
+            </a:r>
+            <a:endParaRPr lang="en-US" altLang="zh-TW" dirty="0" smtClean="0"/>
+          </a:p>
+          <a:p>
+            <a:r>
+              <a:rPr lang="zh-TW" altLang="en-US" dirty="0" smtClean="0"/>
+              <a:t>分類</a:t>
+            </a:r>
+            <a:r>
+              <a:rPr lang="zh-TW" altLang="en-US" dirty="0"/>
+              <a:t>問題採取投票制，每個決策樹投票給一個類別，獲得最多投票的類別為最終結果。迴歸問題每個樹得到的預測結果為實數，最終的預測結果為各個樹預測結果的平均值。</a:t>
+            </a:r>
+            <a:endParaRPr lang="zh-TW" altLang="en-US" dirty="0"/>
           </a:p>
         </p:txBody>
       </p:sp>
@@ -4926,25 +5159,90 @@
           </a:p>
         </p:txBody>
       </p:sp>
-      <p:sp>
-        <p:nvSpPr>
-          <p:cNvPr id="3" name="內容版面配置區 2"/>
-          <p:cNvSpPr>
-            <a:spLocks noGrp="1"/>
-          </p:cNvSpPr>
+      <p:pic>
+        <p:nvPicPr>
+          <p:cNvPr id="2050" name="Picture 2" descr="https://miro.medium.com/max/1730/1*bOOrk_un_DQ7k3THPeZpkA.jpeg"/>
+          <p:cNvPicPr>
+            <a:picLocks noChangeAspect="1" noChangeArrowheads="1"/>
+          </p:cNvPicPr>
+          <p:nvPr/>
+        </p:nvPicPr>
+        <p:blipFill>
+          <a:blip r:embed="rId2">
+            <a:extLst>
+              <a:ext uri="{28A0092B-C50C-407E-A947-70E740481C1C}">
+                <a14:useLocalDpi xmlns:a14="http://schemas.microsoft.com/office/drawing/2010/main" val="0"/>
+              </a:ext>
+            </a:extLst>
+          </a:blip>
+          <a:srcRect/>
+          <a:stretch>
+            <a:fillRect/>
+          </a:stretch>
+        </p:blipFill>
+        <p:spPr bwMode="auto">
+          <a:xfrm>
+            <a:off x="5943600" y="2093759"/>
+            <a:ext cx="6248400" cy="3451217"/>
+          </a:xfrm>
+          <a:prstGeom prst="rect">
+            <a:avLst/>
+          </a:prstGeom>
+          <a:noFill/>
+          <a:extLst>
+            <a:ext uri="{909E8E84-426E-40DD-AFC4-6F175D3DCCD1}">
+              <a14:hiddenFill xmlns:a14="http://schemas.microsoft.com/office/drawing/2010/main">
+                <a:solidFill>
+                  <a:srgbClr val="FFFFFF"/>
+                </a:solidFill>
+              </a14:hiddenFill>
+            </a:ext>
+          </a:extLst>
+        </p:spPr>
+      </p:pic>
+      <p:pic>
+        <p:nvPicPr>
+          <p:cNvPr id="2052" name="Picture 4" descr="https://ithelp.ithome.com.tw/upload/images/20191001/20119971lqLtJSWKl0.png"/>
+          <p:cNvPicPr>
+            <a:picLocks noGrp="1" noChangeAspect="1" noChangeArrowheads="1"/>
+          </p:cNvPicPr>
           <p:nvPr>
             <p:ph idx="1"/>
           </p:nvPr>
-        </p:nvSpPr>
-        <p:spPr/>
-        <p:txBody>
-          <a:bodyPr/>
-          <a:lstStyle/>
-          <a:p>
-            <a:endParaRPr lang="zh-TW" altLang="en-US"/>
-          </a:p>
-        </p:txBody>
-      </p:sp>
+        </p:nvPicPr>
+        <p:blipFill>
+          <a:blip r:embed="rId3">
+            <a:extLst>
+              <a:ext uri="{28A0092B-C50C-407E-A947-70E740481C1C}">
+                <a14:useLocalDpi xmlns:a14="http://schemas.microsoft.com/office/drawing/2010/main" val="0"/>
+              </a:ext>
+            </a:extLst>
+          </a:blip>
+          <a:srcRect/>
+          <a:stretch>
+            <a:fillRect/>
+          </a:stretch>
+        </p:blipFill>
+        <p:spPr bwMode="auto">
+          <a:xfrm>
+            <a:off x="0" y="1690688"/>
+            <a:ext cx="5767454" cy="4351338"/>
+          </a:xfrm>
+          <a:prstGeom prst="rect">
+            <a:avLst/>
+          </a:prstGeom>
+          <a:noFill/>
+          <a:extLst>
+            <a:ext uri="{909E8E84-426E-40DD-AFC4-6F175D3DCCD1}">
+              <a14:hiddenFill xmlns:a14="http://schemas.microsoft.com/office/drawing/2010/main">
+                <a:solidFill>
+                  <a:srgbClr val="FFFFFF"/>
+                </a:solidFill>
+              </a14:hiddenFill>
+            </a:ext>
+          </a:extLst>
+        </p:spPr>
+      </p:pic>
     </p:spTree>
     <p:extLst>
       <p:ext uri="{BB962C8B-B14F-4D97-AF65-F5344CB8AC3E}">
@@ -5155,12 +5453,22 @@
             <p:ph type="title"/>
           </p:nvPr>
         </p:nvSpPr>
-        <p:spPr/>
-        <p:txBody>
-          <a:bodyPr/>
-          <a:lstStyle/>
-          <a:p>
-            <a:endParaRPr lang="zh-TW" altLang="en-US"/>
+        <p:spPr>
+          <a:xfrm>
+            <a:off x="838200" y="2675731"/>
+            <a:ext cx="10515600" cy="1325563"/>
+          </a:xfrm>
+        </p:spPr>
+        <p:txBody>
+          <a:bodyPr/>
+          <a:lstStyle/>
+          <a:p>
+            <a:pPr algn="ctr"/>
+            <a:r>
+              <a:rPr lang="en-US" altLang="zh-TW" dirty="0" smtClean="0"/>
+              <a:t>End </a:t>
+            </a:r>
+            <a:endParaRPr lang="zh-TW" altLang="en-US" dirty="0"/>
           </a:p>
         </p:txBody>
       </p:sp>
@@ -5596,7 +5904,6 @@
               <a:rPr lang="en-US" altLang="zh-TW" dirty="0" smtClean="0"/>
               <a:t>Active</a:t>
             </a:r>
-            <a:endParaRPr lang="en-US" altLang="zh-TW" dirty="0" smtClean="0"/>
           </a:p>
           <a:p>
             <a:pPr marL="0" indent="0">

</xml_diff>